<commit_message>
Animations to session #6
</commit_message>
<xml_diff>
--- a/fundamentals/6-List.pptx
+++ b/fundamentals/6-List.pptx
@@ -219,7 +219,7 @@
           <a:p>
             <a:fld id="{720C9186-47A3-C54A-A8AF-47B660C0099D}" type="datetimeFigureOut">
               <a:rPr lang="en-US" smtClean="0"/>
-              <a:t>8/12/20</a:t>
+              <a:t>8/23/2020</a:t>
             </a:fld>
             <a:endParaRPr lang="en-US"/>
           </a:p>
@@ -636,7 +636,7 @@
           <a:p>
             <a:fld id="{4AAD347D-5ACD-4C99-B74B-A9C85AD731AF}" type="datetimeFigureOut">
               <a:rPr lang="en-US" smtClean="0"/>
-              <a:t>8/12/20</a:t>
+              <a:t>8/23/2020</a:t>
             </a:fld>
             <a:endParaRPr lang="en-US" dirty="0"/>
           </a:p>
@@ -836,7 +836,7 @@
           <a:p>
             <a:fld id="{4AAD347D-5ACD-4C99-B74B-A9C85AD731AF}" type="datetimeFigureOut">
               <a:rPr lang="en-US" smtClean="0"/>
-              <a:t>8/12/20</a:t>
+              <a:t>8/23/2020</a:t>
             </a:fld>
             <a:endParaRPr lang="en-US" dirty="0"/>
           </a:p>
@@ -1047,7 +1047,7 @@
           <a:p>
             <a:fld id="{4AAD347D-5ACD-4C99-B74B-A9C85AD731AF}" type="datetimeFigureOut">
               <a:rPr lang="en-US" smtClean="0"/>
-              <a:t>8/12/20</a:t>
+              <a:t>8/23/2020</a:t>
             </a:fld>
             <a:endParaRPr lang="en-US" dirty="0"/>
           </a:p>
@@ -1248,7 +1248,7 @@
           <a:p>
             <a:fld id="{4AAD347D-5ACD-4C99-B74B-A9C85AD731AF}" type="datetimeFigureOut">
               <a:rPr lang="en-US" smtClean="0"/>
-              <a:t>8/12/20</a:t>
+              <a:t>8/23/2020</a:t>
             </a:fld>
             <a:endParaRPr lang="en-US" dirty="0"/>
           </a:p>
@@ -1525,7 +1525,7 @@
           <a:p>
             <a:fld id="{9796027F-7875-4030-9381-8BD8C4F21935}" type="datetimeFigureOut">
               <a:rPr lang="en-US" smtClean="0"/>
-              <a:t>8/12/20</a:t>
+              <a:t>8/23/2020</a:t>
             </a:fld>
             <a:endParaRPr lang="en-US" dirty="0"/>
           </a:p>
@@ -1793,7 +1793,7 @@
           <a:p>
             <a:fld id="{4AAD347D-5ACD-4C99-B74B-A9C85AD731AF}" type="datetimeFigureOut">
               <a:rPr lang="en-US" smtClean="0"/>
-              <a:t>8/12/20</a:t>
+              <a:t>8/23/2020</a:t>
             </a:fld>
             <a:endParaRPr lang="en-US" dirty="0"/>
           </a:p>
@@ -2214,7 +2214,7 @@
           <a:p>
             <a:fld id="{4AAD347D-5ACD-4C99-B74B-A9C85AD731AF}" type="datetimeFigureOut">
               <a:rPr lang="en-US" smtClean="0"/>
-              <a:t>8/12/20</a:t>
+              <a:t>8/23/2020</a:t>
             </a:fld>
             <a:endParaRPr lang="en-US" dirty="0"/>
           </a:p>
@@ -2357,7 +2357,7 @@
           <a:p>
             <a:fld id="{4509A250-FF31-4206-8172-F9D3106AACB1}" type="datetimeFigureOut">
               <a:rPr lang="en-US" smtClean="0"/>
-              <a:t>8/12/20</a:t>
+              <a:t>8/23/2020</a:t>
             </a:fld>
             <a:endParaRPr lang="en-US" dirty="0"/>
           </a:p>
@@ -2470,7 +2470,7 @@
           <a:p>
             <a:fld id="{4509A250-FF31-4206-8172-F9D3106AACB1}" type="datetimeFigureOut">
               <a:rPr lang="en-US" smtClean="0"/>
-              <a:t>8/12/20</a:t>
+              <a:t>8/23/2020</a:t>
             </a:fld>
             <a:endParaRPr lang="en-US" dirty="0"/>
           </a:p>
@@ -2783,7 +2783,7 @@
           <a:p>
             <a:fld id="{4AAD347D-5ACD-4C99-B74B-A9C85AD731AF}" type="datetimeFigureOut">
               <a:rPr lang="en-US" smtClean="0"/>
-              <a:t>8/12/20</a:t>
+              <a:t>8/23/2020</a:t>
             </a:fld>
             <a:endParaRPr lang="en-US" dirty="0"/>
           </a:p>
@@ -3078,7 +3078,7 @@
           <a:p>
             <a:fld id="{4509A250-FF31-4206-8172-F9D3106AACB1}" type="datetimeFigureOut">
               <a:rPr lang="en-US" smtClean="0"/>
-              <a:t>8/12/20</a:t>
+              <a:t>8/23/2020</a:t>
             </a:fld>
             <a:endParaRPr lang="en-US" dirty="0"/>
           </a:p>
@@ -3321,7 +3321,7 @@
           <a:p>
             <a:fld id="{4AAD347D-5ACD-4C99-B74B-A9C85AD731AF}" type="datetimeFigureOut">
               <a:rPr lang="en-US" smtClean="0"/>
-              <a:t>8/12/20</a:t>
+              <a:t>8/23/2020</a:t>
             </a:fld>
             <a:endParaRPr lang="en-US" dirty="0"/>
           </a:p>
@@ -4135,6 +4135,235 @@
   <p:clrMapOvr>
     <a:masterClrMapping/>
   </p:clrMapOvr>
+  <p:timing>
+    <p:tnLst>
+      <p:par>
+        <p:cTn id="1" dur="indefinite" restart="never" nodeType="tmRoot">
+          <p:childTnLst>
+            <p:seq concurrent="1" nextAc="seek">
+              <p:cTn id="2" dur="indefinite" nodeType="mainSeq">
+                <p:childTnLst>
+                  <p:par>
+                    <p:cTn id="3" fill="hold">
+                      <p:stCondLst>
+                        <p:cond delay="indefinite"/>
+                      </p:stCondLst>
+                      <p:childTnLst>
+                        <p:par>
+                          <p:cTn id="4" fill="hold">
+                            <p:stCondLst>
+                              <p:cond delay="0"/>
+                            </p:stCondLst>
+                            <p:childTnLst>
+                              <p:par>
+                                <p:cTn id="5" presetID="1" presetClass="entr" presetSubtype="0" fill="hold" grpId="0" nodeType="clickEffect">
+                                  <p:stCondLst>
+                                    <p:cond delay="0"/>
+                                  </p:stCondLst>
+                                  <p:childTnLst>
+                                    <p:set>
+                                      <p:cBhvr>
+                                        <p:cTn id="6" dur="1" fill="hold">
+                                          <p:stCondLst>
+                                            <p:cond delay="0"/>
+                                          </p:stCondLst>
+                                        </p:cTn>
+                                        <p:tgtEl>
+                                          <p:spTgt spid="3">
+                                            <p:txEl>
+                                              <p:pRg st="0" end="0"/>
+                                            </p:txEl>
+                                          </p:spTgt>
+                                        </p:tgtEl>
+                                        <p:attrNameLst>
+                                          <p:attrName>style.visibility</p:attrName>
+                                        </p:attrNameLst>
+                                      </p:cBhvr>
+                                      <p:to>
+                                        <p:strVal val="visible"/>
+                                      </p:to>
+                                    </p:set>
+                                  </p:childTnLst>
+                                </p:cTn>
+                              </p:par>
+                            </p:childTnLst>
+                          </p:cTn>
+                        </p:par>
+                      </p:childTnLst>
+                    </p:cTn>
+                  </p:par>
+                  <p:par>
+                    <p:cTn id="7" fill="hold">
+                      <p:stCondLst>
+                        <p:cond delay="indefinite"/>
+                      </p:stCondLst>
+                      <p:childTnLst>
+                        <p:par>
+                          <p:cTn id="8" fill="hold">
+                            <p:stCondLst>
+                              <p:cond delay="0"/>
+                            </p:stCondLst>
+                            <p:childTnLst>
+                              <p:par>
+                                <p:cTn id="9" presetID="1" presetClass="entr" presetSubtype="0" fill="hold" grpId="0" nodeType="clickEffect">
+                                  <p:stCondLst>
+                                    <p:cond delay="0"/>
+                                  </p:stCondLst>
+                                  <p:childTnLst>
+                                    <p:set>
+                                      <p:cBhvr>
+                                        <p:cTn id="10" dur="1" fill="hold">
+                                          <p:stCondLst>
+                                            <p:cond delay="0"/>
+                                          </p:stCondLst>
+                                        </p:cTn>
+                                        <p:tgtEl>
+                                          <p:spTgt spid="3">
+                                            <p:txEl>
+                                              <p:pRg st="1" end="1"/>
+                                            </p:txEl>
+                                          </p:spTgt>
+                                        </p:tgtEl>
+                                        <p:attrNameLst>
+                                          <p:attrName>style.visibility</p:attrName>
+                                        </p:attrNameLst>
+                                      </p:cBhvr>
+                                      <p:to>
+                                        <p:strVal val="visible"/>
+                                      </p:to>
+                                    </p:set>
+                                  </p:childTnLst>
+                                </p:cTn>
+                              </p:par>
+                            </p:childTnLst>
+                          </p:cTn>
+                        </p:par>
+                      </p:childTnLst>
+                    </p:cTn>
+                  </p:par>
+                  <p:par>
+                    <p:cTn id="11" fill="hold">
+                      <p:stCondLst>
+                        <p:cond delay="indefinite"/>
+                      </p:stCondLst>
+                      <p:childTnLst>
+                        <p:par>
+                          <p:cTn id="12" fill="hold">
+                            <p:stCondLst>
+                              <p:cond delay="0"/>
+                            </p:stCondLst>
+                            <p:childTnLst>
+                              <p:par>
+                                <p:cTn id="13" presetID="1" presetClass="entr" presetSubtype="0" fill="hold" grpId="0" nodeType="clickEffect">
+                                  <p:stCondLst>
+                                    <p:cond delay="0"/>
+                                  </p:stCondLst>
+                                  <p:childTnLst>
+                                    <p:set>
+                                      <p:cBhvr>
+                                        <p:cTn id="14" dur="1" fill="hold">
+                                          <p:stCondLst>
+                                            <p:cond delay="0"/>
+                                          </p:stCondLst>
+                                        </p:cTn>
+                                        <p:tgtEl>
+                                          <p:spTgt spid="3">
+                                            <p:txEl>
+                                              <p:pRg st="2" end="2"/>
+                                            </p:txEl>
+                                          </p:spTgt>
+                                        </p:tgtEl>
+                                        <p:attrNameLst>
+                                          <p:attrName>style.visibility</p:attrName>
+                                        </p:attrNameLst>
+                                      </p:cBhvr>
+                                      <p:to>
+                                        <p:strVal val="visible"/>
+                                      </p:to>
+                                    </p:set>
+                                  </p:childTnLst>
+                                </p:cTn>
+                              </p:par>
+                            </p:childTnLst>
+                          </p:cTn>
+                        </p:par>
+                      </p:childTnLst>
+                    </p:cTn>
+                  </p:par>
+                  <p:par>
+                    <p:cTn id="15" fill="hold">
+                      <p:stCondLst>
+                        <p:cond delay="indefinite"/>
+                      </p:stCondLst>
+                      <p:childTnLst>
+                        <p:par>
+                          <p:cTn id="16" fill="hold">
+                            <p:stCondLst>
+                              <p:cond delay="0"/>
+                            </p:stCondLst>
+                            <p:childTnLst>
+                              <p:par>
+                                <p:cTn id="17" presetID="1" presetClass="entr" presetSubtype="0" fill="hold" grpId="0" nodeType="clickEffect">
+                                  <p:stCondLst>
+                                    <p:cond delay="0"/>
+                                  </p:stCondLst>
+                                  <p:childTnLst>
+                                    <p:set>
+                                      <p:cBhvr>
+                                        <p:cTn id="18" dur="1" fill="hold">
+                                          <p:stCondLst>
+                                            <p:cond delay="0"/>
+                                          </p:stCondLst>
+                                        </p:cTn>
+                                        <p:tgtEl>
+                                          <p:spTgt spid="3">
+                                            <p:txEl>
+                                              <p:pRg st="4" end="4"/>
+                                            </p:txEl>
+                                          </p:spTgt>
+                                        </p:tgtEl>
+                                        <p:attrNameLst>
+                                          <p:attrName>style.visibility</p:attrName>
+                                        </p:attrNameLst>
+                                      </p:cBhvr>
+                                      <p:to>
+                                        <p:strVal val="visible"/>
+                                      </p:to>
+                                    </p:set>
+                                  </p:childTnLst>
+                                </p:cTn>
+                              </p:par>
+                            </p:childTnLst>
+                          </p:cTn>
+                        </p:par>
+                      </p:childTnLst>
+                    </p:cTn>
+                  </p:par>
+                </p:childTnLst>
+              </p:cTn>
+              <p:prevCondLst>
+                <p:cond evt="onPrev" delay="0">
+                  <p:tgtEl>
+                    <p:sldTgt/>
+                  </p:tgtEl>
+                </p:cond>
+              </p:prevCondLst>
+              <p:nextCondLst>
+                <p:cond evt="onNext" delay="0">
+                  <p:tgtEl>
+                    <p:sldTgt/>
+                  </p:tgtEl>
+                </p:cond>
+              </p:nextCondLst>
+            </p:seq>
+          </p:childTnLst>
+        </p:cTn>
+      </p:par>
+    </p:tnLst>
+    <p:bldLst>
+      <p:bldP spid="3" grpId="0" build="p"/>
+    </p:bldLst>
+  </p:timing>
 </p:sld>
 </file>
 
@@ -4415,7 +4644,7 @@
                             </p:stCondLst>
                             <p:childTnLst>
                               <p:par>
-                                <p:cTn id="5" presetID="1" presetClass="entr" presetSubtype="0" fill="hold" nodeType="clickEffect">
+                                <p:cTn id="5" presetID="1" presetClass="entr" presetSubtype="0" fill="hold" grpId="0" nodeType="clickEffect">
                                   <p:stCondLst>
                                     <p:cond delay="0"/>
                                   </p:stCondLst>
@@ -4430,7 +4659,7 @@
                                         <p:tgtEl>
                                           <p:spTgt spid="3">
                                             <p:txEl>
-                                              <p:pRg st="7" end="7"/>
+                                              <p:pRg st="0" end="0"/>
                                             </p:txEl>
                                           </p:spTgt>
                                         </p:tgtEl>
@@ -4464,7 +4693,7 @@
                             </p:stCondLst>
                             <p:childTnLst>
                               <p:par>
-                                <p:cTn id="9" presetID="1" presetClass="entr" presetSubtype="0" fill="hold" nodeType="clickEffect">
+                                <p:cTn id="9" presetID="1" presetClass="entr" presetSubtype="0" fill="hold" grpId="0" nodeType="clickEffect">
                                   <p:stCondLst>
                                     <p:cond delay="0"/>
                                   </p:stCondLst>
@@ -4472,6 +4701,300 @@
                                     <p:set>
                                       <p:cBhvr>
                                         <p:cTn id="10" dur="1" fill="hold">
+                                          <p:stCondLst>
+                                            <p:cond delay="0"/>
+                                          </p:stCondLst>
+                                        </p:cTn>
+                                        <p:tgtEl>
+                                          <p:spTgt spid="3">
+                                            <p:txEl>
+                                              <p:pRg st="1" end="1"/>
+                                            </p:txEl>
+                                          </p:spTgt>
+                                        </p:tgtEl>
+                                        <p:attrNameLst>
+                                          <p:attrName>style.visibility</p:attrName>
+                                        </p:attrNameLst>
+                                      </p:cBhvr>
+                                      <p:to>
+                                        <p:strVal val="visible"/>
+                                      </p:to>
+                                    </p:set>
+                                  </p:childTnLst>
+                                </p:cTn>
+                              </p:par>
+                            </p:childTnLst>
+                          </p:cTn>
+                        </p:par>
+                      </p:childTnLst>
+                    </p:cTn>
+                  </p:par>
+                  <p:par>
+                    <p:cTn id="11" fill="hold">
+                      <p:stCondLst>
+                        <p:cond delay="indefinite"/>
+                      </p:stCondLst>
+                      <p:childTnLst>
+                        <p:par>
+                          <p:cTn id="12" fill="hold">
+                            <p:stCondLst>
+                              <p:cond delay="0"/>
+                            </p:stCondLst>
+                            <p:childTnLst>
+                              <p:par>
+                                <p:cTn id="13" presetID="1" presetClass="entr" presetSubtype="0" fill="hold" grpId="0" nodeType="clickEffect">
+                                  <p:stCondLst>
+                                    <p:cond delay="0"/>
+                                  </p:stCondLst>
+                                  <p:childTnLst>
+                                    <p:set>
+                                      <p:cBhvr>
+                                        <p:cTn id="14" dur="1" fill="hold">
+                                          <p:stCondLst>
+                                            <p:cond delay="0"/>
+                                          </p:stCondLst>
+                                        </p:cTn>
+                                        <p:tgtEl>
+                                          <p:spTgt spid="3">
+                                            <p:txEl>
+                                              <p:pRg st="2" end="2"/>
+                                            </p:txEl>
+                                          </p:spTgt>
+                                        </p:tgtEl>
+                                        <p:attrNameLst>
+                                          <p:attrName>style.visibility</p:attrName>
+                                        </p:attrNameLst>
+                                      </p:cBhvr>
+                                      <p:to>
+                                        <p:strVal val="visible"/>
+                                      </p:to>
+                                    </p:set>
+                                  </p:childTnLst>
+                                </p:cTn>
+                              </p:par>
+                            </p:childTnLst>
+                          </p:cTn>
+                        </p:par>
+                      </p:childTnLst>
+                    </p:cTn>
+                  </p:par>
+                  <p:par>
+                    <p:cTn id="15" fill="hold">
+                      <p:stCondLst>
+                        <p:cond delay="indefinite"/>
+                      </p:stCondLst>
+                      <p:childTnLst>
+                        <p:par>
+                          <p:cTn id="16" fill="hold">
+                            <p:stCondLst>
+                              <p:cond delay="0"/>
+                            </p:stCondLst>
+                            <p:childTnLst>
+                              <p:par>
+                                <p:cTn id="17" presetID="1" presetClass="entr" presetSubtype="0" fill="hold" grpId="0" nodeType="clickEffect">
+                                  <p:stCondLst>
+                                    <p:cond delay="0"/>
+                                  </p:stCondLst>
+                                  <p:childTnLst>
+                                    <p:set>
+                                      <p:cBhvr>
+                                        <p:cTn id="18" dur="1" fill="hold">
+                                          <p:stCondLst>
+                                            <p:cond delay="0"/>
+                                          </p:stCondLst>
+                                        </p:cTn>
+                                        <p:tgtEl>
+                                          <p:spTgt spid="3">
+                                            <p:txEl>
+                                              <p:pRg st="3" end="3"/>
+                                            </p:txEl>
+                                          </p:spTgt>
+                                        </p:tgtEl>
+                                        <p:attrNameLst>
+                                          <p:attrName>style.visibility</p:attrName>
+                                        </p:attrNameLst>
+                                      </p:cBhvr>
+                                      <p:to>
+                                        <p:strVal val="visible"/>
+                                      </p:to>
+                                    </p:set>
+                                  </p:childTnLst>
+                                </p:cTn>
+                              </p:par>
+                            </p:childTnLst>
+                          </p:cTn>
+                        </p:par>
+                      </p:childTnLst>
+                    </p:cTn>
+                  </p:par>
+                  <p:par>
+                    <p:cTn id="19" fill="hold">
+                      <p:stCondLst>
+                        <p:cond delay="indefinite"/>
+                      </p:stCondLst>
+                      <p:childTnLst>
+                        <p:par>
+                          <p:cTn id="20" fill="hold">
+                            <p:stCondLst>
+                              <p:cond delay="0"/>
+                            </p:stCondLst>
+                            <p:childTnLst>
+                              <p:par>
+                                <p:cTn id="21" presetID="1" presetClass="entr" presetSubtype="0" fill="hold" grpId="0" nodeType="clickEffect">
+                                  <p:stCondLst>
+                                    <p:cond delay="0"/>
+                                  </p:stCondLst>
+                                  <p:childTnLst>
+                                    <p:set>
+                                      <p:cBhvr>
+                                        <p:cTn id="22" dur="1" fill="hold">
+                                          <p:stCondLst>
+                                            <p:cond delay="0"/>
+                                          </p:stCondLst>
+                                        </p:cTn>
+                                        <p:tgtEl>
+                                          <p:spTgt spid="3">
+                                            <p:txEl>
+                                              <p:pRg st="4" end="4"/>
+                                            </p:txEl>
+                                          </p:spTgt>
+                                        </p:tgtEl>
+                                        <p:attrNameLst>
+                                          <p:attrName>style.visibility</p:attrName>
+                                        </p:attrNameLst>
+                                      </p:cBhvr>
+                                      <p:to>
+                                        <p:strVal val="visible"/>
+                                      </p:to>
+                                    </p:set>
+                                  </p:childTnLst>
+                                </p:cTn>
+                              </p:par>
+                            </p:childTnLst>
+                          </p:cTn>
+                        </p:par>
+                      </p:childTnLst>
+                    </p:cTn>
+                  </p:par>
+                  <p:par>
+                    <p:cTn id="23" fill="hold">
+                      <p:stCondLst>
+                        <p:cond delay="indefinite"/>
+                      </p:stCondLst>
+                      <p:childTnLst>
+                        <p:par>
+                          <p:cTn id="24" fill="hold">
+                            <p:stCondLst>
+                              <p:cond delay="0"/>
+                            </p:stCondLst>
+                            <p:childTnLst>
+                              <p:par>
+                                <p:cTn id="25" presetID="1" presetClass="entr" presetSubtype="0" fill="hold" grpId="0" nodeType="clickEffect">
+                                  <p:stCondLst>
+                                    <p:cond delay="0"/>
+                                  </p:stCondLst>
+                                  <p:childTnLst>
+                                    <p:set>
+                                      <p:cBhvr>
+                                        <p:cTn id="26" dur="1" fill="hold">
+                                          <p:stCondLst>
+                                            <p:cond delay="0"/>
+                                          </p:stCondLst>
+                                        </p:cTn>
+                                        <p:tgtEl>
+                                          <p:spTgt spid="3">
+                                            <p:txEl>
+                                              <p:pRg st="5" end="5"/>
+                                            </p:txEl>
+                                          </p:spTgt>
+                                        </p:tgtEl>
+                                        <p:attrNameLst>
+                                          <p:attrName>style.visibility</p:attrName>
+                                        </p:attrNameLst>
+                                      </p:cBhvr>
+                                      <p:to>
+                                        <p:strVal val="visible"/>
+                                      </p:to>
+                                    </p:set>
+                                  </p:childTnLst>
+                                </p:cTn>
+                              </p:par>
+                            </p:childTnLst>
+                          </p:cTn>
+                        </p:par>
+                      </p:childTnLst>
+                    </p:cTn>
+                  </p:par>
+                  <p:par>
+                    <p:cTn id="27" fill="hold">
+                      <p:stCondLst>
+                        <p:cond delay="indefinite"/>
+                      </p:stCondLst>
+                      <p:childTnLst>
+                        <p:par>
+                          <p:cTn id="28" fill="hold">
+                            <p:stCondLst>
+                              <p:cond delay="0"/>
+                            </p:stCondLst>
+                            <p:childTnLst>
+                              <p:par>
+                                <p:cTn id="29" presetID="1" presetClass="entr" presetSubtype="0" fill="hold" grpId="0" nodeType="clickEffect">
+                                  <p:stCondLst>
+                                    <p:cond delay="0"/>
+                                  </p:stCondLst>
+                                  <p:childTnLst>
+                                    <p:set>
+                                      <p:cBhvr>
+                                        <p:cTn id="30" dur="1" fill="hold">
+                                          <p:stCondLst>
+                                            <p:cond delay="0"/>
+                                          </p:stCondLst>
+                                        </p:cTn>
+                                        <p:tgtEl>
+                                          <p:spTgt spid="3">
+                                            <p:txEl>
+                                              <p:pRg st="7" end="7"/>
+                                            </p:txEl>
+                                          </p:spTgt>
+                                        </p:tgtEl>
+                                        <p:attrNameLst>
+                                          <p:attrName>style.visibility</p:attrName>
+                                        </p:attrNameLst>
+                                      </p:cBhvr>
+                                      <p:to>
+                                        <p:strVal val="visible"/>
+                                      </p:to>
+                                    </p:set>
+                                  </p:childTnLst>
+                                </p:cTn>
+                              </p:par>
+                            </p:childTnLst>
+                          </p:cTn>
+                        </p:par>
+                      </p:childTnLst>
+                    </p:cTn>
+                  </p:par>
+                  <p:par>
+                    <p:cTn id="31" fill="hold">
+                      <p:stCondLst>
+                        <p:cond delay="indefinite"/>
+                      </p:stCondLst>
+                      <p:childTnLst>
+                        <p:par>
+                          <p:cTn id="32" fill="hold">
+                            <p:stCondLst>
+                              <p:cond delay="0"/>
+                            </p:stCondLst>
+                            <p:childTnLst>
+                              <p:par>
+                                <p:cTn id="33" presetID="1" presetClass="entr" presetSubtype="0" fill="hold" grpId="0" nodeType="clickEffect">
+                                  <p:stCondLst>
+                                    <p:cond delay="0"/>
+                                  </p:stCondLst>
+                                  <p:childTnLst>
+                                    <p:set>
+                                      <p:cBhvr>
+                                        <p:cTn id="34" dur="1" fill="hold">
                                           <p:stCondLst>
                                             <p:cond delay="0"/>
                                           </p:stCondLst>
@@ -4521,6 +5044,9 @@
         </p:cTn>
       </p:par>
     </p:tnLst>
+    <p:bldLst>
+      <p:bldP spid="3" grpId="0" build="p"/>
+    </p:bldLst>
   </p:timing>
 </p:sld>
 </file>
@@ -9956,6 +10482,656 @@
   <p:clrMapOvr>
     <a:masterClrMapping/>
   </p:clrMapOvr>
+  <p:timing>
+    <p:tnLst>
+      <p:par>
+        <p:cTn id="1" dur="indefinite" restart="never" nodeType="tmRoot">
+          <p:childTnLst>
+            <p:seq concurrent="1" nextAc="seek">
+              <p:cTn id="2" dur="indefinite" nodeType="mainSeq">
+                <p:childTnLst>
+                  <p:par>
+                    <p:cTn id="3" fill="hold">
+                      <p:stCondLst>
+                        <p:cond delay="indefinite"/>
+                      </p:stCondLst>
+                      <p:childTnLst>
+                        <p:par>
+                          <p:cTn id="4" fill="hold">
+                            <p:stCondLst>
+                              <p:cond delay="0"/>
+                            </p:stCondLst>
+                            <p:childTnLst>
+                              <p:par>
+                                <p:cTn id="5" presetID="1" presetClass="entr" presetSubtype="0" fill="hold" grpId="0" nodeType="clickEffect">
+                                  <p:stCondLst>
+                                    <p:cond delay="0"/>
+                                  </p:stCondLst>
+                                  <p:childTnLst>
+                                    <p:set>
+                                      <p:cBhvr>
+                                        <p:cTn id="6" dur="1" fill="hold">
+                                          <p:stCondLst>
+                                            <p:cond delay="0"/>
+                                          </p:stCondLst>
+                                        </p:cTn>
+                                        <p:tgtEl>
+                                          <p:spTgt spid="3">
+                                            <p:txEl>
+                                              <p:pRg st="0" end="0"/>
+                                            </p:txEl>
+                                          </p:spTgt>
+                                        </p:tgtEl>
+                                        <p:attrNameLst>
+                                          <p:attrName>style.visibility</p:attrName>
+                                        </p:attrNameLst>
+                                      </p:cBhvr>
+                                      <p:to>
+                                        <p:strVal val="visible"/>
+                                      </p:to>
+                                    </p:set>
+                                  </p:childTnLst>
+                                </p:cTn>
+                              </p:par>
+                            </p:childTnLst>
+                          </p:cTn>
+                        </p:par>
+                      </p:childTnLst>
+                    </p:cTn>
+                  </p:par>
+                  <p:par>
+                    <p:cTn id="7" fill="hold">
+                      <p:stCondLst>
+                        <p:cond delay="indefinite"/>
+                      </p:stCondLst>
+                      <p:childTnLst>
+                        <p:par>
+                          <p:cTn id="8" fill="hold">
+                            <p:stCondLst>
+                              <p:cond delay="0"/>
+                            </p:stCondLst>
+                            <p:childTnLst>
+                              <p:par>
+                                <p:cTn id="9" presetID="1" presetClass="entr" presetSubtype="0" fill="hold" grpId="0" nodeType="clickEffect">
+                                  <p:stCondLst>
+                                    <p:cond delay="0"/>
+                                  </p:stCondLst>
+                                  <p:childTnLst>
+                                    <p:set>
+                                      <p:cBhvr>
+                                        <p:cTn id="10" dur="1" fill="hold">
+                                          <p:stCondLst>
+                                            <p:cond delay="0"/>
+                                          </p:stCondLst>
+                                        </p:cTn>
+                                        <p:tgtEl>
+                                          <p:spTgt spid="3">
+                                            <p:txEl>
+                                              <p:pRg st="1" end="1"/>
+                                            </p:txEl>
+                                          </p:spTgt>
+                                        </p:tgtEl>
+                                        <p:attrNameLst>
+                                          <p:attrName>style.visibility</p:attrName>
+                                        </p:attrNameLst>
+                                      </p:cBhvr>
+                                      <p:to>
+                                        <p:strVal val="visible"/>
+                                      </p:to>
+                                    </p:set>
+                                  </p:childTnLst>
+                                </p:cTn>
+                              </p:par>
+                            </p:childTnLst>
+                          </p:cTn>
+                        </p:par>
+                      </p:childTnLst>
+                    </p:cTn>
+                  </p:par>
+                  <p:par>
+                    <p:cTn id="11" fill="hold">
+                      <p:stCondLst>
+                        <p:cond delay="indefinite"/>
+                      </p:stCondLst>
+                      <p:childTnLst>
+                        <p:par>
+                          <p:cTn id="12" fill="hold">
+                            <p:stCondLst>
+                              <p:cond delay="0"/>
+                            </p:stCondLst>
+                            <p:childTnLst>
+                              <p:par>
+                                <p:cTn id="13" presetID="1" presetClass="entr" presetSubtype="0" fill="hold" grpId="0" nodeType="clickEffect">
+                                  <p:stCondLst>
+                                    <p:cond delay="0"/>
+                                  </p:stCondLst>
+                                  <p:childTnLst>
+                                    <p:set>
+                                      <p:cBhvr>
+                                        <p:cTn id="14" dur="1" fill="hold">
+                                          <p:stCondLst>
+                                            <p:cond delay="0"/>
+                                          </p:stCondLst>
+                                        </p:cTn>
+                                        <p:tgtEl>
+                                          <p:spTgt spid="3">
+                                            <p:txEl>
+                                              <p:pRg st="2" end="2"/>
+                                            </p:txEl>
+                                          </p:spTgt>
+                                        </p:tgtEl>
+                                        <p:attrNameLst>
+                                          <p:attrName>style.visibility</p:attrName>
+                                        </p:attrNameLst>
+                                      </p:cBhvr>
+                                      <p:to>
+                                        <p:strVal val="visible"/>
+                                      </p:to>
+                                    </p:set>
+                                  </p:childTnLst>
+                                </p:cTn>
+                              </p:par>
+                              <p:par>
+                                <p:cTn id="15" presetID="1" presetClass="entr" presetSubtype="0" fill="hold" grpId="0" nodeType="withEffect">
+                                  <p:stCondLst>
+                                    <p:cond delay="0"/>
+                                  </p:stCondLst>
+                                  <p:childTnLst>
+                                    <p:set>
+                                      <p:cBhvr>
+                                        <p:cTn id="16" dur="1" fill="hold">
+                                          <p:stCondLst>
+                                            <p:cond delay="0"/>
+                                          </p:stCondLst>
+                                        </p:cTn>
+                                        <p:tgtEl>
+                                          <p:spTgt spid="3">
+                                            <p:txEl>
+                                              <p:pRg st="3" end="3"/>
+                                            </p:txEl>
+                                          </p:spTgt>
+                                        </p:tgtEl>
+                                        <p:attrNameLst>
+                                          <p:attrName>style.visibility</p:attrName>
+                                        </p:attrNameLst>
+                                      </p:cBhvr>
+                                      <p:to>
+                                        <p:strVal val="visible"/>
+                                      </p:to>
+                                    </p:set>
+                                  </p:childTnLst>
+                                </p:cTn>
+                              </p:par>
+                              <p:par>
+                                <p:cTn id="17" presetID="1" presetClass="entr" presetSubtype="0" fill="hold" grpId="0" nodeType="withEffect">
+                                  <p:stCondLst>
+                                    <p:cond delay="0"/>
+                                  </p:stCondLst>
+                                  <p:childTnLst>
+                                    <p:set>
+                                      <p:cBhvr>
+                                        <p:cTn id="18" dur="1" fill="hold">
+                                          <p:stCondLst>
+                                            <p:cond delay="0"/>
+                                          </p:stCondLst>
+                                        </p:cTn>
+                                        <p:tgtEl>
+                                          <p:spTgt spid="3">
+                                            <p:txEl>
+                                              <p:pRg st="4" end="4"/>
+                                            </p:txEl>
+                                          </p:spTgt>
+                                        </p:tgtEl>
+                                        <p:attrNameLst>
+                                          <p:attrName>style.visibility</p:attrName>
+                                        </p:attrNameLst>
+                                      </p:cBhvr>
+                                      <p:to>
+                                        <p:strVal val="visible"/>
+                                      </p:to>
+                                    </p:set>
+                                  </p:childTnLst>
+                                </p:cTn>
+                              </p:par>
+                              <p:par>
+                                <p:cTn id="19" presetID="1" presetClass="entr" presetSubtype="0" fill="hold" grpId="0" nodeType="withEffect">
+                                  <p:stCondLst>
+                                    <p:cond delay="0"/>
+                                  </p:stCondLst>
+                                  <p:childTnLst>
+                                    <p:set>
+                                      <p:cBhvr>
+                                        <p:cTn id="20" dur="1" fill="hold">
+                                          <p:stCondLst>
+                                            <p:cond delay="0"/>
+                                          </p:stCondLst>
+                                        </p:cTn>
+                                        <p:tgtEl>
+                                          <p:spTgt spid="3">
+                                            <p:txEl>
+                                              <p:pRg st="5" end="5"/>
+                                            </p:txEl>
+                                          </p:spTgt>
+                                        </p:tgtEl>
+                                        <p:attrNameLst>
+                                          <p:attrName>style.visibility</p:attrName>
+                                        </p:attrNameLst>
+                                      </p:cBhvr>
+                                      <p:to>
+                                        <p:strVal val="visible"/>
+                                      </p:to>
+                                    </p:set>
+                                  </p:childTnLst>
+                                </p:cTn>
+                              </p:par>
+                              <p:par>
+                                <p:cTn id="21" presetID="1" presetClass="entr" presetSubtype="0" fill="hold" grpId="0" nodeType="withEffect">
+                                  <p:stCondLst>
+                                    <p:cond delay="0"/>
+                                  </p:stCondLst>
+                                  <p:childTnLst>
+                                    <p:set>
+                                      <p:cBhvr>
+                                        <p:cTn id="22" dur="1" fill="hold">
+                                          <p:stCondLst>
+                                            <p:cond delay="0"/>
+                                          </p:stCondLst>
+                                        </p:cTn>
+                                        <p:tgtEl>
+                                          <p:spTgt spid="3">
+                                            <p:txEl>
+                                              <p:pRg st="6" end="6"/>
+                                            </p:txEl>
+                                          </p:spTgt>
+                                        </p:tgtEl>
+                                        <p:attrNameLst>
+                                          <p:attrName>style.visibility</p:attrName>
+                                        </p:attrNameLst>
+                                      </p:cBhvr>
+                                      <p:to>
+                                        <p:strVal val="visible"/>
+                                      </p:to>
+                                    </p:set>
+                                  </p:childTnLst>
+                                </p:cTn>
+                              </p:par>
+                              <p:par>
+                                <p:cTn id="23" presetID="1" presetClass="entr" presetSubtype="0" fill="hold" grpId="0" nodeType="withEffect">
+                                  <p:stCondLst>
+                                    <p:cond delay="0"/>
+                                  </p:stCondLst>
+                                  <p:childTnLst>
+                                    <p:set>
+                                      <p:cBhvr>
+                                        <p:cTn id="24" dur="1" fill="hold">
+                                          <p:stCondLst>
+                                            <p:cond delay="0"/>
+                                          </p:stCondLst>
+                                        </p:cTn>
+                                        <p:tgtEl>
+                                          <p:spTgt spid="3">
+                                            <p:txEl>
+                                              <p:pRg st="7" end="7"/>
+                                            </p:txEl>
+                                          </p:spTgt>
+                                        </p:tgtEl>
+                                        <p:attrNameLst>
+                                          <p:attrName>style.visibility</p:attrName>
+                                        </p:attrNameLst>
+                                      </p:cBhvr>
+                                      <p:to>
+                                        <p:strVal val="visible"/>
+                                      </p:to>
+                                    </p:set>
+                                  </p:childTnLst>
+                                </p:cTn>
+                              </p:par>
+                            </p:childTnLst>
+                          </p:cTn>
+                        </p:par>
+                      </p:childTnLst>
+                    </p:cTn>
+                  </p:par>
+                  <p:par>
+                    <p:cTn id="25" fill="hold">
+                      <p:stCondLst>
+                        <p:cond delay="indefinite"/>
+                      </p:stCondLst>
+                      <p:childTnLst>
+                        <p:par>
+                          <p:cTn id="26" fill="hold">
+                            <p:stCondLst>
+                              <p:cond delay="0"/>
+                            </p:stCondLst>
+                            <p:childTnLst>
+                              <p:par>
+                                <p:cTn id="27" presetID="1" presetClass="entr" presetSubtype="0" fill="hold" grpId="0" nodeType="clickEffect">
+                                  <p:stCondLst>
+                                    <p:cond delay="0"/>
+                                  </p:stCondLst>
+                                  <p:childTnLst>
+                                    <p:set>
+                                      <p:cBhvr>
+                                        <p:cTn id="28" dur="1" fill="hold">
+                                          <p:stCondLst>
+                                            <p:cond delay="0"/>
+                                          </p:stCondLst>
+                                        </p:cTn>
+                                        <p:tgtEl>
+                                          <p:spTgt spid="3">
+                                            <p:txEl>
+                                              <p:pRg st="8" end="8"/>
+                                            </p:txEl>
+                                          </p:spTgt>
+                                        </p:tgtEl>
+                                        <p:attrNameLst>
+                                          <p:attrName>style.visibility</p:attrName>
+                                        </p:attrNameLst>
+                                      </p:cBhvr>
+                                      <p:to>
+                                        <p:strVal val="visible"/>
+                                      </p:to>
+                                    </p:set>
+                                  </p:childTnLst>
+                                </p:cTn>
+                              </p:par>
+                              <p:par>
+                                <p:cTn id="29" presetID="1" presetClass="entr" presetSubtype="0" fill="hold" grpId="0" nodeType="withEffect">
+                                  <p:stCondLst>
+                                    <p:cond delay="0"/>
+                                  </p:stCondLst>
+                                  <p:childTnLst>
+                                    <p:set>
+                                      <p:cBhvr>
+                                        <p:cTn id="30" dur="1" fill="hold">
+                                          <p:stCondLst>
+                                            <p:cond delay="0"/>
+                                          </p:stCondLst>
+                                        </p:cTn>
+                                        <p:tgtEl>
+                                          <p:spTgt spid="3">
+                                            <p:txEl>
+                                              <p:pRg st="9" end="9"/>
+                                            </p:txEl>
+                                          </p:spTgt>
+                                        </p:tgtEl>
+                                        <p:attrNameLst>
+                                          <p:attrName>style.visibility</p:attrName>
+                                        </p:attrNameLst>
+                                      </p:cBhvr>
+                                      <p:to>
+                                        <p:strVal val="visible"/>
+                                      </p:to>
+                                    </p:set>
+                                  </p:childTnLst>
+                                </p:cTn>
+                              </p:par>
+                              <p:par>
+                                <p:cTn id="31" presetID="1" presetClass="entr" presetSubtype="0" fill="hold" grpId="0" nodeType="withEffect">
+                                  <p:stCondLst>
+                                    <p:cond delay="0"/>
+                                  </p:stCondLst>
+                                  <p:childTnLst>
+                                    <p:set>
+                                      <p:cBhvr>
+                                        <p:cTn id="32" dur="1" fill="hold">
+                                          <p:stCondLst>
+                                            <p:cond delay="0"/>
+                                          </p:stCondLst>
+                                        </p:cTn>
+                                        <p:tgtEl>
+                                          <p:spTgt spid="3">
+                                            <p:txEl>
+                                              <p:pRg st="10" end="10"/>
+                                            </p:txEl>
+                                          </p:spTgt>
+                                        </p:tgtEl>
+                                        <p:attrNameLst>
+                                          <p:attrName>style.visibility</p:attrName>
+                                        </p:attrNameLst>
+                                      </p:cBhvr>
+                                      <p:to>
+                                        <p:strVal val="visible"/>
+                                      </p:to>
+                                    </p:set>
+                                  </p:childTnLst>
+                                </p:cTn>
+                              </p:par>
+                              <p:par>
+                                <p:cTn id="33" presetID="1" presetClass="entr" presetSubtype="0" fill="hold" grpId="0" nodeType="withEffect">
+                                  <p:stCondLst>
+                                    <p:cond delay="0"/>
+                                  </p:stCondLst>
+                                  <p:childTnLst>
+                                    <p:set>
+                                      <p:cBhvr>
+                                        <p:cTn id="34" dur="1" fill="hold">
+                                          <p:stCondLst>
+                                            <p:cond delay="0"/>
+                                          </p:stCondLst>
+                                        </p:cTn>
+                                        <p:tgtEl>
+                                          <p:spTgt spid="3">
+                                            <p:txEl>
+                                              <p:pRg st="11" end="11"/>
+                                            </p:txEl>
+                                          </p:spTgt>
+                                        </p:tgtEl>
+                                        <p:attrNameLst>
+                                          <p:attrName>style.visibility</p:attrName>
+                                        </p:attrNameLst>
+                                      </p:cBhvr>
+                                      <p:to>
+                                        <p:strVal val="visible"/>
+                                      </p:to>
+                                    </p:set>
+                                  </p:childTnLst>
+                                </p:cTn>
+                              </p:par>
+                              <p:par>
+                                <p:cTn id="35" presetID="1" presetClass="entr" presetSubtype="0" fill="hold" grpId="0" nodeType="withEffect">
+                                  <p:stCondLst>
+                                    <p:cond delay="0"/>
+                                  </p:stCondLst>
+                                  <p:childTnLst>
+                                    <p:set>
+                                      <p:cBhvr>
+                                        <p:cTn id="36" dur="1" fill="hold">
+                                          <p:stCondLst>
+                                            <p:cond delay="0"/>
+                                          </p:stCondLst>
+                                        </p:cTn>
+                                        <p:tgtEl>
+                                          <p:spTgt spid="3">
+                                            <p:txEl>
+                                              <p:pRg st="12" end="12"/>
+                                            </p:txEl>
+                                          </p:spTgt>
+                                        </p:tgtEl>
+                                        <p:attrNameLst>
+                                          <p:attrName>style.visibility</p:attrName>
+                                        </p:attrNameLst>
+                                      </p:cBhvr>
+                                      <p:to>
+                                        <p:strVal val="visible"/>
+                                      </p:to>
+                                    </p:set>
+                                  </p:childTnLst>
+                                </p:cTn>
+                              </p:par>
+                              <p:par>
+                                <p:cTn id="37" presetID="1" presetClass="entr" presetSubtype="0" fill="hold" grpId="0" nodeType="withEffect">
+                                  <p:stCondLst>
+                                    <p:cond delay="0"/>
+                                  </p:stCondLst>
+                                  <p:childTnLst>
+                                    <p:set>
+                                      <p:cBhvr>
+                                        <p:cTn id="38" dur="1" fill="hold">
+                                          <p:stCondLst>
+                                            <p:cond delay="0"/>
+                                          </p:stCondLst>
+                                        </p:cTn>
+                                        <p:tgtEl>
+                                          <p:spTgt spid="3">
+                                            <p:txEl>
+                                              <p:pRg st="13" end="13"/>
+                                            </p:txEl>
+                                          </p:spTgt>
+                                        </p:tgtEl>
+                                        <p:attrNameLst>
+                                          <p:attrName>style.visibility</p:attrName>
+                                        </p:attrNameLst>
+                                      </p:cBhvr>
+                                      <p:to>
+                                        <p:strVal val="visible"/>
+                                      </p:to>
+                                    </p:set>
+                                  </p:childTnLst>
+                                </p:cTn>
+                              </p:par>
+                            </p:childTnLst>
+                          </p:cTn>
+                        </p:par>
+                      </p:childTnLst>
+                    </p:cTn>
+                  </p:par>
+                  <p:par>
+                    <p:cTn id="39" fill="hold">
+                      <p:stCondLst>
+                        <p:cond delay="indefinite"/>
+                      </p:stCondLst>
+                      <p:childTnLst>
+                        <p:par>
+                          <p:cTn id="40" fill="hold">
+                            <p:stCondLst>
+                              <p:cond delay="0"/>
+                            </p:stCondLst>
+                            <p:childTnLst>
+                              <p:par>
+                                <p:cTn id="41" presetID="1" presetClass="entr" presetSubtype="0" fill="hold" grpId="0" nodeType="clickEffect">
+                                  <p:stCondLst>
+                                    <p:cond delay="0"/>
+                                  </p:stCondLst>
+                                  <p:childTnLst>
+                                    <p:set>
+                                      <p:cBhvr>
+                                        <p:cTn id="42" dur="1" fill="hold">
+                                          <p:stCondLst>
+                                            <p:cond delay="0"/>
+                                          </p:stCondLst>
+                                        </p:cTn>
+                                        <p:tgtEl>
+                                          <p:spTgt spid="3">
+                                            <p:txEl>
+                                              <p:pRg st="14" end="14"/>
+                                            </p:txEl>
+                                          </p:spTgt>
+                                        </p:tgtEl>
+                                        <p:attrNameLst>
+                                          <p:attrName>style.visibility</p:attrName>
+                                        </p:attrNameLst>
+                                      </p:cBhvr>
+                                      <p:to>
+                                        <p:strVal val="visible"/>
+                                      </p:to>
+                                    </p:set>
+                                  </p:childTnLst>
+                                </p:cTn>
+                              </p:par>
+                              <p:par>
+                                <p:cTn id="43" presetID="1" presetClass="entr" presetSubtype="0" fill="hold" grpId="0" nodeType="withEffect">
+                                  <p:stCondLst>
+                                    <p:cond delay="0"/>
+                                  </p:stCondLst>
+                                  <p:childTnLst>
+                                    <p:set>
+                                      <p:cBhvr>
+                                        <p:cTn id="44" dur="1" fill="hold">
+                                          <p:stCondLst>
+                                            <p:cond delay="0"/>
+                                          </p:stCondLst>
+                                        </p:cTn>
+                                        <p:tgtEl>
+                                          <p:spTgt spid="3">
+                                            <p:txEl>
+                                              <p:pRg st="15" end="15"/>
+                                            </p:txEl>
+                                          </p:spTgt>
+                                        </p:tgtEl>
+                                        <p:attrNameLst>
+                                          <p:attrName>style.visibility</p:attrName>
+                                        </p:attrNameLst>
+                                      </p:cBhvr>
+                                      <p:to>
+                                        <p:strVal val="visible"/>
+                                      </p:to>
+                                    </p:set>
+                                  </p:childTnLst>
+                                </p:cTn>
+                              </p:par>
+                              <p:par>
+                                <p:cTn id="45" presetID="1" presetClass="entr" presetSubtype="0" fill="hold" grpId="0" nodeType="withEffect">
+                                  <p:stCondLst>
+                                    <p:cond delay="0"/>
+                                  </p:stCondLst>
+                                  <p:childTnLst>
+                                    <p:set>
+                                      <p:cBhvr>
+                                        <p:cTn id="46" dur="1" fill="hold">
+                                          <p:stCondLst>
+                                            <p:cond delay="0"/>
+                                          </p:stCondLst>
+                                        </p:cTn>
+                                        <p:tgtEl>
+                                          <p:spTgt spid="3">
+                                            <p:txEl>
+                                              <p:pRg st="16" end="16"/>
+                                            </p:txEl>
+                                          </p:spTgt>
+                                        </p:tgtEl>
+                                        <p:attrNameLst>
+                                          <p:attrName>style.visibility</p:attrName>
+                                        </p:attrNameLst>
+                                      </p:cBhvr>
+                                      <p:to>
+                                        <p:strVal val="visible"/>
+                                      </p:to>
+                                    </p:set>
+                                  </p:childTnLst>
+                                </p:cTn>
+                              </p:par>
+                            </p:childTnLst>
+                          </p:cTn>
+                        </p:par>
+                      </p:childTnLst>
+                    </p:cTn>
+                  </p:par>
+                </p:childTnLst>
+              </p:cTn>
+              <p:prevCondLst>
+                <p:cond evt="onPrev" delay="0">
+                  <p:tgtEl>
+                    <p:sldTgt/>
+                  </p:tgtEl>
+                </p:cond>
+              </p:prevCondLst>
+              <p:nextCondLst>
+                <p:cond evt="onNext" delay="0">
+                  <p:tgtEl>
+                    <p:sldTgt/>
+                  </p:tgtEl>
+                </p:cond>
+              </p:nextCondLst>
+            </p:seq>
+          </p:childTnLst>
+        </p:cTn>
+      </p:par>
+    </p:tnLst>
+    <p:bldLst>
+      <p:bldP spid="3" grpId="0" build="p"/>
+    </p:bldLst>
+  </p:timing>
 </p:sld>
 </file>
 
@@ -10223,6 +11399,395 @@
   <p:clrMapOvr>
     <a:masterClrMapping/>
   </p:clrMapOvr>
+  <p:timing>
+    <p:tnLst>
+      <p:par>
+        <p:cTn id="1" dur="indefinite" restart="never" nodeType="tmRoot">
+          <p:childTnLst>
+            <p:seq concurrent="1" nextAc="seek">
+              <p:cTn id="2" dur="indefinite" nodeType="mainSeq">
+                <p:childTnLst>
+                  <p:par>
+                    <p:cTn id="3" fill="hold">
+                      <p:stCondLst>
+                        <p:cond delay="indefinite"/>
+                      </p:stCondLst>
+                      <p:childTnLst>
+                        <p:par>
+                          <p:cTn id="4" fill="hold">
+                            <p:stCondLst>
+                              <p:cond delay="0"/>
+                            </p:stCondLst>
+                            <p:childTnLst>
+                              <p:par>
+                                <p:cTn id="5" presetID="1" presetClass="entr" presetSubtype="0" fill="hold" grpId="0" nodeType="clickEffect">
+                                  <p:stCondLst>
+                                    <p:cond delay="0"/>
+                                  </p:stCondLst>
+                                  <p:childTnLst>
+                                    <p:set>
+                                      <p:cBhvr>
+                                        <p:cTn id="6" dur="1" fill="hold">
+                                          <p:stCondLst>
+                                            <p:cond delay="0"/>
+                                          </p:stCondLst>
+                                        </p:cTn>
+                                        <p:tgtEl>
+                                          <p:spTgt spid="3">
+                                            <p:txEl>
+                                              <p:pRg st="0" end="0"/>
+                                            </p:txEl>
+                                          </p:spTgt>
+                                        </p:tgtEl>
+                                        <p:attrNameLst>
+                                          <p:attrName>style.visibility</p:attrName>
+                                        </p:attrNameLst>
+                                      </p:cBhvr>
+                                      <p:to>
+                                        <p:strVal val="visible"/>
+                                      </p:to>
+                                    </p:set>
+                                  </p:childTnLst>
+                                </p:cTn>
+                              </p:par>
+                              <p:par>
+                                <p:cTn id="7" presetID="1" presetClass="entr" presetSubtype="0" fill="hold" grpId="0" nodeType="withEffect">
+                                  <p:stCondLst>
+                                    <p:cond delay="0"/>
+                                  </p:stCondLst>
+                                  <p:childTnLst>
+                                    <p:set>
+                                      <p:cBhvr>
+                                        <p:cTn id="8" dur="1" fill="hold">
+                                          <p:stCondLst>
+                                            <p:cond delay="0"/>
+                                          </p:stCondLst>
+                                        </p:cTn>
+                                        <p:tgtEl>
+                                          <p:spTgt spid="3">
+                                            <p:txEl>
+                                              <p:pRg st="1" end="1"/>
+                                            </p:txEl>
+                                          </p:spTgt>
+                                        </p:tgtEl>
+                                        <p:attrNameLst>
+                                          <p:attrName>style.visibility</p:attrName>
+                                        </p:attrNameLst>
+                                      </p:cBhvr>
+                                      <p:to>
+                                        <p:strVal val="visible"/>
+                                      </p:to>
+                                    </p:set>
+                                  </p:childTnLst>
+                                </p:cTn>
+                              </p:par>
+                              <p:par>
+                                <p:cTn id="9" presetID="1" presetClass="entr" presetSubtype="0" fill="hold" grpId="0" nodeType="withEffect">
+                                  <p:stCondLst>
+                                    <p:cond delay="0"/>
+                                  </p:stCondLst>
+                                  <p:childTnLst>
+                                    <p:set>
+                                      <p:cBhvr>
+                                        <p:cTn id="10" dur="1" fill="hold">
+                                          <p:stCondLst>
+                                            <p:cond delay="0"/>
+                                          </p:stCondLst>
+                                        </p:cTn>
+                                        <p:tgtEl>
+                                          <p:spTgt spid="3">
+                                            <p:txEl>
+                                              <p:pRg st="2" end="2"/>
+                                            </p:txEl>
+                                          </p:spTgt>
+                                        </p:tgtEl>
+                                        <p:attrNameLst>
+                                          <p:attrName>style.visibility</p:attrName>
+                                        </p:attrNameLst>
+                                      </p:cBhvr>
+                                      <p:to>
+                                        <p:strVal val="visible"/>
+                                      </p:to>
+                                    </p:set>
+                                  </p:childTnLst>
+                                </p:cTn>
+                              </p:par>
+                            </p:childTnLst>
+                          </p:cTn>
+                        </p:par>
+                      </p:childTnLst>
+                    </p:cTn>
+                  </p:par>
+                  <p:par>
+                    <p:cTn id="11" fill="hold">
+                      <p:stCondLst>
+                        <p:cond delay="indefinite"/>
+                      </p:stCondLst>
+                      <p:childTnLst>
+                        <p:par>
+                          <p:cTn id="12" fill="hold">
+                            <p:stCondLst>
+                              <p:cond delay="0"/>
+                            </p:stCondLst>
+                            <p:childTnLst>
+                              <p:par>
+                                <p:cTn id="13" presetID="1" presetClass="entr" presetSubtype="0" fill="hold" grpId="0" nodeType="clickEffect">
+                                  <p:stCondLst>
+                                    <p:cond delay="0"/>
+                                  </p:stCondLst>
+                                  <p:childTnLst>
+                                    <p:set>
+                                      <p:cBhvr>
+                                        <p:cTn id="14" dur="1" fill="hold">
+                                          <p:stCondLst>
+                                            <p:cond delay="0"/>
+                                          </p:stCondLst>
+                                        </p:cTn>
+                                        <p:tgtEl>
+                                          <p:spTgt spid="3">
+                                            <p:txEl>
+                                              <p:pRg st="3" end="3"/>
+                                            </p:txEl>
+                                          </p:spTgt>
+                                        </p:tgtEl>
+                                        <p:attrNameLst>
+                                          <p:attrName>style.visibility</p:attrName>
+                                        </p:attrNameLst>
+                                      </p:cBhvr>
+                                      <p:to>
+                                        <p:strVal val="visible"/>
+                                      </p:to>
+                                    </p:set>
+                                  </p:childTnLst>
+                                </p:cTn>
+                              </p:par>
+                            </p:childTnLst>
+                          </p:cTn>
+                        </p:par>
+                      </p:childTnLst>
+                    </p:cTn>
+                  </p:par>
+                  <p:par>
+                    <p:cTn id="15" fill="hold">
+                      <p:stCondLst>
+                        <p:cond delay="indefinite"/>
+                      </p:stCondLst>
+                      <p:childTnLst>
+                        <p:par>
+                          <p:cTn id="16" fill="hold">
+                            <p:stCondLst>
+                              <p:cond delay="0"/>
+                            </p:stCondLst>
+                            <p:childTnLst>
+                              <p:par>
+                                <p:cTn id="17" presetID="1" presetClass="entr" presetSubtype="0" fill="hold" grpId="0" nodeType="clickEffect">
+                                  <p:stCondLst>
+                                    <p:cond delay="0"/>
+                                  </p:stCondLst>
+                                  <p:childTnLst>
+                                    <p:set>
+                                      <p:cBhvr>
+                                        <p:cTn id="18" dur="1" fill="hold">
+                                          <p:stCondLst>
+                                            <p:cond delay="0"/>
+                                          </p:stCondLst>
+                                        </p:cTn>
+                                        <p:tgtEl>
+                                          <p:spTgt spid="3">
+                                            <p:txEl>
+                                              <p:pRg st="4" end="4"/>
+                                            </p:txEl>
+                                          </p:spTgt>
+                                        </p:tgtEl>
+                                        <p:attrNameLst>
+                                          <p:attrName>style.visibility</p:attrName>
+                                        </p:attrNameLst>
+                                      </p:cBhvr>
+                                      <p:to>
+                                        <p:strVal val="visible"/>
+                                      </p:to>
+                                    </p:set>
+                                  </p:childTnLst>
+                                </p:cTn>
+                              </p:par>
+                            </p:childTnLst>
+                          </p:cTn>
+                        </p:par>
+                      </p:childTnLst>
+                    </p:cTn>
+                  </p:par>
+                  <p:par>
+                    <p:cTn id="19" fill="hold">
+                      <p:stCondLst>
+                        <p:cond delay="indefinite"/>
+                      </p:stCondLst>
+                      <p:childTnLst>
+                        <p:par>
+                          <p:cTn id="20" fill="hold">
+                            <p:stCondLst>
+                              <p:cond delay="0"/>
+                            </p:stCondLst>
+                            <p:childTnLst>
+                              <p:par>
+                                <p:cTn id="21" presetID="1" presetClass="entr" presetSubtype="0" fill="hold" grpId="0" nodeType="clickEffect">
+                                  <p:stCondLst>
+                                    <p:cond delay="0"/>
+                                  </p:stCondLst>
+                                  <p:childTnLst>
+                                    <p:set>
+                                      <p:cBhvr>
+                                        <p:cTn id="22" dur="1" fill="hold">
+                                          <p:stCondLst>
+                                            <p:cond delay="0"/>
+                                          </p:stCondLst>
+                                        </p:cTn>
+                                        <p:tgtEl>
+                                          <p:spTgt spid="3">
+                                            <p:txEl>
+                                              <p:pRg st="5" end="5"/>
+                                            </p:txEl>
+                                          </p:spTgt>
+                                        </p:tgtEl>
+                                        <p:attrNameLst>
+                                          <p:attrName>style.visibility</p:attrName>
+                                        </p:attrNameLst>
+                                      </p:cBhvr>
+                                      <p:to>
+                                        <p:strVal val="visible"/>
+                                      </p:to>
+                                    </p:set>
+                                  </p:childTnLst>
+                                </p:cTn>
+                              </p:par>
+                            </p:childTnLst>
+                          </p:cTn>
+                        </p:par>
+                      </p:childTnLst>
+                    </p:cTn>
+                  </p:par>
+                  <p:par>
+                    <p:cTn id="23" fill="hold">
+                      <p:stCondLst>
+                        <p:cond delay="indefinite"/>
+                      </p:stCondLst>
+                      <p:childTnLst>
+                        <p:par>
+                          <p:cTn id="24" fill="hold">
+                            <p:stCondLst>
+                              <p:cond delay="0"/>
+                            </p:stCondLst>
+                            <p:childTnLst>
+                              <p:par>
+                                <p:cTn id="25" presetID="1" presetClass="entr" presetSubtype="0" fill="hold" grpId="0" nodeType="clickEffect">
+                                  <p:stCondLst>
+                                    <p:cond delay="0"/>
+                                  </p:stCondLst>
+                                  <p:childTnLst>
+                                    <p:set>
+                                      <p:cBhvr>
+                                        <p:cTn id="26" dur="1" fill="hold">
+                                          <p:stCondLst>
+                                            <p:cond delay="0"/>
+                                          </p:stCondLst>
+                                        </p:cTn>
+                                        <p:tgtEl>
+                                          <p:spTgt spid="3">
+                                            <p:txEl>
+                                              <p:pRg st="6" end="6"/>
+                                            </p:txEl>
+                                          </p:spTgt>
+                                        </p:tgtEl>
+                                        <p:attrNameLst>
+                                          <p:attrName>style.visibility</p:attrName>
+                                        </p:attrNameLst>
+                                      </p:cBhvr>
+                                      <p:to>
+                                        <p:strVal val="visible"/>
+                                      </p:to>
+                                    </p:set>
+                                  </p:childTnLst>
+                                </p:cTn>
+                              </p:par>
+                            </p:childTnLst>
+                          </p:cTn>
+                        </p:par>
+                      </p:childTnLst>
+                    </p:cTn>
+                  </p:par>
+                  <p:par>
+                    <p:cTn id="27" fill="hold">
+                      <p:stCondLst>
+                        <p:cond delay="indefinite"/>
+                      </p:stCondLst>
+                      <p:childTnLst>
+                        <p:par>
+                          <p:cTn id="28" fill="hold">
+                            <p:stCondLst>
+                              <p:cond delay="0"/>
+                            </p:stCondLst>
+                            <p:childTnLst>
+                              <p:par>
+                                <p:cTn id="29" presetID="1" presetClass="entr" presetSubtype="0" fill="hold" grpId="0" nodeType="clickEffect">
+                                  <p:stCondLst>
+                                    <p:cond delay="0"/>
+                                  </p:stCondLst>
+                                  <p:childTnLst>
+                                    <p:set>
+                                      <p:cBhvr>
+                                        <p:cTn id="30" dur="1" fill="hold">
+                                          <p:stCondLst>
+                                            <p:cond delay="0"/>
+                                          </p:stCondLst>
+                                        </p:cTn>
+                                        <p:tgtEl>
+                                          <p:spTgt spid="3">
+                                            <p:txEl>
+                                              <p:pRg st="9" end="9"/>
+                                            </p:txEl>
+                                          </p:spTgt>
+                                        </p:tgtEl>
+                                        <p:attrNameLst>
+                                          <p:attrName>style.visibility</p:attrName>
+                                        </p:attrNameLst>
+                                      </p:cBhvr>
+                                      <p:to>
+                                        <p:strVal val="visible"/>
+                                      </p:to>
+                                    </p:set>
+                                  </p:childTnLst>
+                                </p:cTn>
+                              </p:par>
+                            </p:childTnLst>
+                          </p:cTn>
+                        </p:par>
+                      </p:childTnLst>
+                    </p:cTn>
+                  </p:par>
+                </p:childTnLst>
+              </p:cTn>
+              <p:prevCondLst>
+                <p:cond evt="onPrev" delay="0">
+                  <p:tgtEl>
+                    <p:sldTgt/>
+                  </p:tgtEl>
+                </p:cond>
+              </p:prevCondLst>
+              <p:nextCondLst>
+                <p:cond evt="onNext" delay="0">
+                  <p:tgtEl>
+                    <p:sldTgt/>
+                  </p:tgtEl>
+                </p:cond>
+              </p:nextCondLst>
+            </p:seq>
+          </p:childTnLst>
+        </p:cTn>
+      </p:par>
+    </p:tnLst>
+    <p:bldLst>
+      <p:bldP spid="3" grpId="0" build="p"/>
+    </p:bldLst>
+  </p:timing>
 </p:sld>
 </file>
 
@@ -10942,6 +12507,284 @@
   <p:clrMapOvr>
     <a:masterClrMapping/>
   </p:clrMapOvr>
+  <p:timing>
+    <p:tnLst>
+      <p:par>
+        <p:cTn id="1" dur="indefinite" restart="never" nodeType="tmRoot">
+          <p:childTnLst>
+            <p:seq concurrent="1" nextAc="seek">
+              <p:cTn id="2" dur="indefinite" nodeType="mainSeq">
+                <p:childTnLst>
+                  <p:par>
+                    <p:cTn id="3" fill="hold">
+                      <p:stCondLst>
+                        <p:cond delay="indefinite"/>
+                      </p:stCondLst>
+                      <p:childTnLst>
+                        <p:par>
+                          <p:cTn id="4" fill="hold">
+                            <p:stCondLst>
+                              <p:cond delay="0"/>
+                            </p:stCondLst>
+                            <p:childTnLst>
+                              <p:par>
+                                <p:cTn id="5" presetID="1" presetClass="entr" presetSubtype="0" fill="hold" grpId="0" nodeType="clickEffect">
+                                  <p:stCondLst>
+                                    <p:cond delay="0"/>
+                                  </p:stCondLst>
+                                  <p:childTnLst>
+                                    <p:set>
+                                      <p:cBhvr>
+                                        <p:cTn id="6" dur="1" fill="hold">
+                                          <p:stCondLst>
+                                            <p:cond delay="0"/>
+                                          </p:stCondLst>
+                                        </p:cTn>
+                                        <p:tgtEl>
+                                          <p:spTgt spid="3">
+                                            <p:txEl>
+                                              <p:pRg st="0" end="0"/>
+                                            </p:txEl>
+                                          </p:spTgt>
+                                        </p:tgtEl>
+                                        <p:attrNameLst>
+                                          <p:attrName>style.visibility</p:attrName>
+                                        </p:attrNameLst>
+                                      </p:cBhvr>
+                                      <p:to>
+                                        <p:strVal val="visible"/>
+                                      </p:to>
+                                    </p:set>
+                                  </p:childTnLst>
+                                </p:cTn>
+                              </p:par>
+                            </p:childTnLst>
+                          </p:cTn>
+                        </p:par>
+                      </p:childTnLst>
+                    </p:cTn>
+                  </p:par>
+                  <p:par>
+                    <p:cTn id="7" fill="hold">
+                      <p:stCondLst>
+                        <p:cond delay="indefinite"/>
+                      </p:stCondLst>
+                      <p:childTnLst>
+                        <p:par>
+                          <p:cTn id="8" fill="hold">
+                            <p:stCondLst>
+                              <p:cond delay="0"/>
+                            </p:stCondLst>
+                            <p:childTnLst>
+                              <p:par>
+                                <p:cTn id="9" presetID="1" presetClass="entr" presetSubtype="0" fill="hold" grpId="0" nodeType="clickEffect">
+                                  <p:stCondLst>
+                                    <p:cond delay="0"/>
+                                  </p:stCondLst>
+                                  <p:childTnLst>
+                                    <p:set>
+                                      <p:cBhvr>
+                                        <p:cTn id="10" dur="1" fill="hold">
+                                          <p:stCondLst>
+                                            <p:cond delay="0"/>
+                                          </p:stCondLst>
+                                        </p:cTn>
+                                        <p:tgtEl>
+                                          <p:spTgt spid="3">
+                                            <p:txEl>
+                                              <p:pRg st="1" end="1"/>
+                                            </p:txEl>
+                                          </p:spTgt>
+                                        </p:tgtEl>
+                                        <p:attrNameLst>
+                                          <p:attrName>style.visibility</p:attrName>
+                                        </p:attrNameLst>
+                                      </p:cBhvr>
+                                      <p:to>
+                                        <p:strVal val="visible"/>
+                                      </p:to>
+                                    </p:set>
+                                  </p:childTnLst>
+                                </p:cTn>
+                              </p:par>
+                            </p:childTnLst>
+                          </p:cTn>
+                        </p:par>
+                      </p:childTnLst>
+                    </p:cTn>
+                  </p:par>
+                  <p:par>
+                    <p:cTn id="11" fill="hold">
+                      <p:stCondLst>
+                        <p:cond delay="indefinite"/>
+                      </p:stCondLst>
+                      <p:childTnLst>
+                        <p:par>
+                          <p:cTn id="12" fill="hold">
+                            <p:stCondLst>
+                              <p:cond delay="0"/>
+                            </p:stCondLst>
+                            <p:childTnLst>
+                              <p:par>
+                                <p:cTn id="13" presetID="1" presetClass="entr" presetSubtype="0" fill="hold" grpId="0" nodeType="clickEffect">
+                                  <p:stCondLst>
+                                    <p:cond delay="0"/>
+                                  </p:stCondLst>
+                                  <p:childTnLst>
+                                    <p:set>
+                                      <p:cBhvr>
+                                        <p:cTn id="14" dur="1" fill="hold">
+                                          <p:stCondLst>
+                                            <p:cond delay="0"/>
+                                          </p:stCondLst>
+                                        </p:cTn>
+                                        <p:tgtEl>
+                                          <p:spTgt spid="3">
+                                            <p:txEl>
+                                              <p:pRg st="4" end="4"/>
+                                            </p:txEl>
+                                          </p:spTgt>
+                                        </p:tgtEl>
+                                        <p:attrNameLst>
+                                          <p:attrName>style.visibility</p:attrName>
+                                        </p:attrNameLst>
+                                      </p:cBhvr>
+                                      <p:to>
+                                        <p:strVal val="visible"/>
+                                      </p:to>
+                                    </p:set>
+                                  </p:childTnLst>
+                                </p:cTn>
+                              </p:par>
+                            </p:childTnLst>
+                          </p:cTn>
+                        </p:par>
+                      </p:childTnLst>
+                    </p:cTn>
+                  </p:par>
+                  <p:par>
+                    <p:cTn id="15" fill="hold">
+                      <p:stCondLst>
+                        <p:cond delay="indefinite"/>
+                      </p:stCondLst>
+                      <p:childTnLst>
+                        <p:par>
+                          <p:cTn id="16" fill="hold">
+                            <p:stCondLst>
+                              <p:cond delay="0"/>
+                            </p:stCondLst>
+                            <p:childTnLst>
+                              <p:par>
+                                <p:cTn id="17" presetID="1" presetClass="entr" presetSubtype="0" fill="hold" grpId="0" nodeType="clickEffect">
+                                  <p:stCondLst>
+                                    <p:cond delay="0"/>
+                                  </p:stCondLst>
+                                  <p:childTnLst>
+                                    <p:set>
+                                      <p:cBhvr>
+                                        <p:cTn id="18" dur="1" fill="hold">
+                                          <p:stCondLst>
+                                            <p:cond delay="0"/>
+                                          </p:stCondLst>
+                                        </p:cTn>
+                                        <p:tgtEl>
+                                          <p:spTgt spid="3">
+                                            <p:txEl>
+                                              <p:pRg st="5" end="5"/>
+                                            </p:txEl>
+                                          </p:spTgt>
+                                        </p:tgtEl>
+                                        <p:attrNameLst>
+                                          <p:attrName>style.visibility</p:attrName>
+                                        </p:attrNameLst>
+                                      </p:cBhvr>
+                                      <p:to>
+                                        <p:strVal val="visible"/>
+                                      </p:to>
+                                    </p:set>
+                                  </p:childTnLst>
+                                </p:cTn>
+                              </p:par>
+                            </p:childTnLst>
+                          </p:cTn>
+                        </p:par>
+                      </p:childTnLst>
+                    </p:cTn>
+                  </p:par>
+                  <p:par>
+                    <p:cTn id="19" fill="hold">
+                      <p:stCondLst>
+                        <p:cond delay="indefinite"/>
+                      </p:stCondLst>
+                      <p:childTnLst>
+                        <p:par>
+                          <p:cTn id="20" fill="hold">
+                            <p:stCondLst>
+                              <p:cond delay="0"/>
+                            </p:stCondLst>
+                            <p:childTnLst>
+                              <p:par>
+                                <p:cTn id="21" presetID="1" presetClass="entr" presetSubtype="0" fill="hold" grpId="0" nodeType="clickEffect">
+                                  <p:stCondLst>
+                                    <p:cond delay="0"/>
+                                  </p:stCondLst>
+                                  <p:childTnLst>
+                                    <p:set>
+                                      <p:cBhvr>
+                                        <p:cTn id="22" dur="1" fill="hold">
+                                          <p:stCondLst>
+                                            <p:cond delay="0"/>
+                                          </p:stCondLst>
+                                        </p:cTn>
+                                        <p:tgtEl>
+                                          <p:spTgt spid="3">
+                                            <p:txEl>
+                                              <p:pRg st="6" end="6"/>
+                                            </p:txEl>
+                                          </p:spTgt>
+                                        </p:tgtEl>
+                                        <p:attrNameLst>
+                                          <p:attrName>style.visibility</p:attrName>
+                                        </p:attrNameLst>
+                                      </p:cBhvr>
+                                      <p:to>
+                                        <p:strVal val="visible"/>
+                                      </p:to>
+                                    </p:set>
+                                  </p:childTnLst>
+                                </p:cTn>
+                              </p:par>
+                            </p:childTnLst>
+                          </p:cTn>
+                        </p:par>
+                      </p:childTnLst>
+                    </p:cTn>
+                  </p:par>
+                </p:childTnLst>
+              </p:cTn>
+              <p:prevCondLst>
+                <p:cond evt="onPrev" delay="0">
+                  <p:tgtEl>
+                    <p:sldTgt/>
+                  </p:tgtEl>
+                </p:cond>
+              </p:prevCondLst>
+              <p:nextCondLst>
+                <p:cond evt="onNext" delay="0">
+                  <p:tgtEl>
+                    <p:sldTgt/>
+                  </p:tgtEl>
+                </p:cond>
+              </p:nextCondLst>
+            </p:seq>
+          </p:childTnLst>
+        </p:cTn>
+      </p:par>
+    </p:tnLst>
+    <p:bldLst>
+      <p:bldP spid="3" grpId="0" build="p"/>
+    </p:bldLst>
+  </p:timing>
 </p:sld>
 </file>
 
@@ -13286,6 +15129,284 @@
   <p:clrMapOvr>
     <a:masterClrMapping/>
   </p:clrMapOvr>
+  <p:timing>
+    <p:tnLst>
+      <p:par>
+        <p:cTn id="1" dur="indefinite" restart="never" nodeType="tmRoot">
+          <p:childTnLst>
+            <p:seq concurrent="1" nextAc="seek">
+              <p:cTn id="2" dur="indefinite" nodeType="mainSeq">
+                <p:childTnLst>
+                  <p:par>
+                    <p:cTn id="3" fill="hold">
+                      <p:stCondLst>
+                        <p:cond delay="indefinite"/>
+                      </p:stCondLst>
+                      <p:childTnLst>
+                        <p:par>
+                          <p:cTn id="4" fill="hold">
+                            <p:stCondLst>
+                              <p:cond delay="0"/>
+                            </p:stCondLst>
+                            <p:childTnLst>
+                              <p:par>
+                                <p:cTn id="5" presetID="1" presetClass="entr" presetSubtype="0" fill="hold" grpId="0" nodeType="clickEffect">
+                                  <p:stCondLst>
+                                    <p:cond delay="0"/>
+                                  </p:stCondLst>
+                                  <p:childTnLst>
+                                    <p:set>
+                                      <p:cBhvr>
+                                        <p:cTn id="6" dur="1" fill="hold">
+                                          <p:stCondLst>
+                                            <p:cond delay="0"/>
+                                          </p:stCondLst>
+                                        </p:cTn>
+                                        <p:tgtEl>
+                                          <p:spTgt spid="3">
+                                            <p:txEl>
+                                              <p:pRg st="0" end="0"/>
+                                            </p:txEl>
+                                          </p:spTgt>
+                                        </p:tgtEl>
+                                        <p:attrNameLst>
+                                          <p:attrName>style.visibility</p:attrName>
+                                        </p:attrNameLst>
+                                      </p:cBhvr>
+                                      <p:to>
+                                        <p:strVal val="visible"/>
+                                      </p:to>
+                                    </p:set>
+                                  </p:childTnLst>
+                                </p:cTn>
+                              </p:par>
+                            </p:childTnLst>
+                          </p:cTn>
+                        </p:par>
+                      </p:childTnLst>
+                    </p:cTn>
+                  </p:par>
+                  <p:par>
+                    <p:cTn id="7" fill="hold">
+                      <p:stCondLst>
+                        <p:cond delay="indefinite"/>
+                      </p:stCondLst>
+                      <p:childTnLst>
+                        <p:par>
+                          <p:cTn id="8" fill="hold">
+                            <p:stCondLst>
+                              <p:cond delay="0"/>
+                            </p:stCondLst>
+                            <p:childTnLst>
+                              <p:par>
+                                <p:cTn id="9" presetID="1" presetClass="entr" presetSubtype="0" fill="hold" grpId="0" nodeType="clickEffect">
+                                  <p:stCondLst>
+                                    <p:cond delay="0"/>
+                                  </p:stCondLst>
+                                  <p:childTnLst>
+                                    <p:set>
+                                      <p:cBhvr>
+                                        <p:cTn id="10" dur="1" fill="hold">
+                                          <p:stCondLst>
+                                            <p:cond delay="0"/>
+                                          </p:stCondLst>
+                                        </p:cTn>
+                                        <p:tgtEl>
+                                          <p:spTgt spid="3">
+                                            <p:txEl>
+                                              <p:pRg st="1" end="1"/>
+                                            </p:txEl>
+                                          </p:spTgt>
+                                        </p:tgtEl>
+                                        <p:attrNameLst>
+                                          <p:attrName>style.visibility</p:attrName>
+                                        </p:attrNameLst>
+                                      </p:cBhvr>
+                                      <p:to>
+                                        <p:strVal val="visible"/>
+                                      </p:to>
+                                    </p:set>
+                                  </p:childTnLst>
+                                </p:cTn>
+                              </p:par>
+                            </p:childTnLst>
+                          </p:cTn>
+                        </p:par>
+                      </p:childTnLst>
+                    </p:cTn>
+                  </p:par>
+                  <p:par>
+                    <p:cTn id="11" fill="hold">
+                      <p:stCondLst>
+                        <p:cond delay="indefinite"/>
+                      </p:stCondLst>
+                      <p:childTnLst>
+                        <p:par>
+                          <p:cTn id="12" fill="hold">
+                            <p:stCondLst>
+                              <p:cond delay="0"/>
+                            </p:stCondLst>
+                            <p:childTnLst>
+                              <p:par>
+                                <p:cTn id="13" presetID="1" presetClass="entr" presetSubtype="0" fill="hold" grpId="0" nodeType="clickEffect">
+                                  <p:stCondLst>
+                                    <p:cond delay="0"/>
+                                  </p:stCondLst>
+                                  <p:childTnLst>
+                                    <p:set>
+                                      <p:cBhvr>
+                                        <p:cTn id="14" dur="1" fill="hold">
+                                          <p:stCondLst>
+                                            <p:cond delay="0"/>
+                                          </p:stCondLst>
+                                        </p:cTn>
+                                        <p:tgtEl>
+                                          <p:spTgt spid="3">
+                                            <p:txEl>
+                                              <p:pRg st="4" end="4"/>
+                                            </p:txEl>
+                                          </p:spTgt>
+                                        </p:tgtEl>
+                                        <p:attrNameLst>
+                                          <p:attrName>style.visibility</p:attrName>
+                                        </p:attrNameLst>
+                                      </p:cBhvr>
+                                      <p:to>
+                                        <p:strVal val="visible"/>
+                                      </p:to>
+                                    </p:set>
+                                  </p:childTnLst>
+                                </p:cTn>
+                              </p:par>
+                            </p:childTnLst>
+                          </p:cTn>
+                        </p:par>
+                      </p:childTnLst>
+                    </p:cTn>
+                  </p:par>
+                  <p:par>
+                    <p:cTn id="15" fill="hold">
+                      <p:stCondLst>
+                        <p:cond delay="indefinite"/>
+                      </p:stCondLst>
+                      <p:childTnLst>
+                        <p:par>
+                          <p:cTn id="16" fill="hold">
+                            <p:stCondLst>
+                              <p:cond delay="0"/>
+                            </p:stCondLst>
+                            <p:childTnLst>
+                              <p:par>
+                                <p:cTn id="17" presetID="1" presetClass="entr" presetSubtype="0" fill="hold" grpId="0" nodeType="clickEffect">
+                                  <p:stCondLst>
+                                    <p:cond delay="0"/>
+                                  </p:stCondLst>
+                                  <p:childTnLst>
+                                    <p:set>
+                                      <p:cBhvr>
+                                        <p:cTn id="18" dur="1" fill="hold">
+                                          <p:stCondLst>
+                                            <p:cond delay="0"/>
+                                          </p:stCondLst>
+                                        </p:cTn>
+                                        <p:tgtEl>
+                                          <p:spTgt spid="3">
+                                            <p:txEl>
+                                              <p:pRg st="5" end="5"/>
+                                            </p:txEl>
+                                          </p:spTgt>
+                                        </p:tgtEl>
+                                        <p:attrNameLst>
+                                          <p:attrName>style.visibility</p:attrName>
+                                        </p:attrNameLst>
+                                      </p:cBhvr>
+                                      <p:to>
+                                        <p:strVal val="visible"/>
+                                      </p:to>
+                                    </p:set>
+                                  </p:childTnLst>
+                                </p:cTn>
+                              </p:par>
+                            </p:childTnLst>
+                          </p:cTn>
+                        </p:par>
+                      </p:childTnLst>
+                    </p:cTn>
+                  </p:par>
+                  <p:par>
+                    <p:cTn id="19" fill="hold">
+                      <p:stCondLst>
+                        <p:cond delay="indefinite"/>
+                      </p:stCondLst>
+                      <p:childTnLst>
+                        <p:par>
+                          <p:cTn id="20" fill="hold">
+                            <p:stCondLst>
+                              <p:cond delay="0"/>
+                            </p:stCondLst>
+                            <p:childTnLst>
+                              <p:par>
+                                <p:cTn id="21" presetID="1" presetClass="entr" presetSubtype="0" fill="hold" grpId="0" nodeType="clickEffect">
+                                  <p:stCondLst>
+                                    <p:cond delay="0"/>
+                                  </p:stCondLst>
+                                  <p:childTnLst>
+                                    <p:set>
+                                      <p:cBhvr>
+                                        <p:cTn id="22" dur="1" fill="hold">
+                                          <p:stCondLst>
+                                            <p:cond delay="0"/>
+                                          </p:stCondLst>
+                                        </p:cTn>
+                                        <p:tgtEl>
+                                          <p:spTgt spid="3">
+                                            <p:txEl>
+                                              <p:pRg st="7" end="7"/>
+                                            </p:txEl>
+                                          </p:spTgt>
+                                        </p:tgtEl>
+                                        <p:attrNameLst>
+                                          <p:attrName>style.visibility</p:attrName>
+                                        </p:attrNameLst>
+                                      </p:cBhvr>
+                                      <p:to>
+                                        <p:strVal val="visible"/>
+                                      </p:to>
+                                    </p:set>
+                                  </p:childTnLst>
+                                </p:cTn>
+                              </p:par>
+                            </p:childTnLst>
+                          </p:cTn>
+                        </p:par>
+                      </p:childTnLst>
+                    </p:cTn>
+                  </p:par>
+                </p:childTnLst>
+              </p:cTn>
+              <p:prevCondLst>
+                <p:cond evt="onPrev" delay="0">
+                  <p:tgtEl>
+                    <p:sldTgt/>
+                  </p:tgtEl>
+                </p:cond>
+              </p:prevCondLst>
+              <p:nextCondLst>
+                <p:cond evt="onNext" delay="0">
+                  <p:tgtEl>
+                    <p:sldTgt/>
+                  </p:tgtEl>
+                </p:cond>
+              </p:nextCondLst>
+            </p:seq>
+          </p:childTnLst>
+        </p:cTn>
+      </p:par>
+    </p:tnLst>
+    <p:bldLst>
+      <p:bldP spid="3" grpId="0" build="p"/>
+    </p:bldLst>
+  </p:timing>
 </p:sld>
 </file>
 

</xml_diff>